<commit_message>
Redo snapshot model figure
</commit_message>
<xml_diff>
--- a/man/figures/figures.pptx
+++ b/man/figures/figures.pptx
@@ -5,11 +5,12 @@
     <p:sldMasterId id="2147483648" r:id="rId1"/>
   </p:sldMasterIdLst>
   <p:notesMasterIdLst>
-    <p:notesMasterId r:id="rId4"/>
+    <p:notesMasterId r:id="rId5"/>
   </p:notesMasterIdLst>
   <p:sldIdLst>
     <p:sldId id="256" r:id="rId2"/>
     <p:sldId id="257" r:id="rId3"/>
+    <p:sldId id="258" r:id="rId4"/>
   </p:sldIdLst>
   <p:sldSz cx="12192000" cy="6858000"/>
   <p:notesSz cx="6858000" cy="9144000"/>
@@ -198,7 +199,7 @@
           <a:p>
             <a:fld id="{B254144D-9C3B-CD45-A9D7-9EA6BBF390DA}" type="datetimeFigureOut">
               <a:rPr lang="en-US" smtClean="0"/>
-              <a:t>11/18/21</a:t>
+              <a:t>1/11/22</a:t>
             </a:fld>
             <a:endParaRPr lang="en-US"/>
           </a:p>
@@ -633,6 +634,90 @@
 </p:notes>
 </file>
 
+<file path=ppt/notesSlides/notesSlide3.xml><?xml version="1.0" encoding="utf-8"?>
+<p:notes xmlns:a="http://schemas.openxmlformats.org/drawingml/2006/main" xmlns:r="http://schemas.openxmlformats.org/officeDocument/2006/relationships" xmlns:p="http://schemas.openxmlformats.org/presentationml/2006/main">
+  <p:cSld>
+    <p:spTree>
+      <p:nvGrpSpPr>
+        <p:cNvPr id="1" name=""/>
+        <p:cNvGrpSpPr/>
+        <p:nvPr/>
+      </p:nvGrpSpPr>
+      <p:grpSpPr>
+        <a:xfrm>
+          <a:off x="0" y="0"/>
+          <a:ext cx="0" cy="0"/>
+          <a:chOff x="0" y="0"/>
+          <a:chExt cx="0" cy="0"/>
+        </a:xfrm>
+      </p:grpSpPr>
+      <p:sp>
+        <p:nvSpPr>
+          <p:cNvPr id="2" name="Slide Image Placeholder 1"/>
+          <p:cNvSpPr>
+            <a:spLocks noGrp="1" noRot="1" noChangeAspect="1"/>
+          </p:cNvSpPr>
+          <p:nvPr>
+            <p:ph type="sldImg"/>
+          </p:nvPr>
+        </p:nvSpPr>
+        <p:spPr/>
+      </p:sp>
+      <p:sp>
+        <p:nvSpPr>
+          <p:cNvPr id="3" name="Notes Placeholder 2"/>
+          <p:cNvSpPr>
+            <a:spLocks noGrp="1"/>
+          </p:cNvSpPr>
+          <p:nvPr>
+            <p:ph type="body" idx="1"/>
+          </p:nvPr>
+        </p:nvSpPr>
+        <p:spPr/>
+        <p:txBody>
+          <a:bodyPr/>
+          <a:lstStyle/>
+          <a:p>
+            <a:endParaRPr lang="en-US" dirty="0"/>
+          </a:p>
+        </p:txBody>
+      </p:sp>
+      <p:sp>
+        <p:nvSpPr>
+          <p:cNvPr id="4" name="Slide Number Placeholder 3"/>
+          <p:cNvSpPr>
+            <a:spLocks noGrp="1"/>
+          </p:cNvSpPr>
+          <p:nvPr>
+            <p:ph type="sldNum" sz="quarter" idx="5"/>
+          </p:nvPr>
+        </p:nvSpPr>
+        <p:spPr/>
+        <p:txBody>
+          <a:bodyPr/>
+          <a:lstStyle/>
+          <a:p>
+            <a:fld id="{7E74EA63-2FC4-A54F-8A08-0688C4BBF34C}" type="slidenum">
+              <a:rPr lang="en-US" smtClean="0"/>
+              <a:t>3</a:t>
+            </a:fld>
+            <a:endParaRPr lang="en-US"/>
+          </a:p>
+        </p:txBody>
+      </p:sp>
+    </p:spTree>
+    <p:extLst>
+      <p:ext uri="{BB962C8B-B14F-4D97-AF65-F5344CB8AC3E}">
+        <p14:creationId xmlns:p14="http://schemas.microsoft.com/office/powerpoint/2010/main" val="2699129708"/>
+      </p:ext>
+    </p:extLst>
+  </p:cSld>
+  <p:clrMapOvr>
+    <a:masterClrMapping/>
+  </p:clrMapOvr>
+</p:notes>
+</file>
+
 <file path=ppt/slideLayouts/slideLayout1.xml><?xml version="1.0" encoding="utf-8"?>
 <p:sldLayout xmlns:a="http://schemas.openxmlformats.org/drawingml/2006/main" xmlns:r="http://schemas.openxmlformats.org/officeDocument/2006/relationships" xmlns:p="http://schemas.openxmlformats.org/presentationml/2006/main" type="title" preserve="1">
   <p:cSld name="Title Slide">
@@ -780,7 +865,7 @@
           <a:p>
             <a:fld id="{A940254F-D129-FD4A-9280-0810AAA19FB6}" type="datetimeFigureOut">
               <a:rPr lang="en-US" smtClean="0"/>
-              <a:t>11/18/21</a:t>
+              <a:t>1/11/22</a:t>
             </a:fld>
             <a:endParaRPr lang="en-US" dirty="0"/>
           </a:p>
@@ -978,7 +1063,7 @@
           <a:p>
             <a:fld id="{A940254F-D129-FD4A-9280-0810AAA19FB6}" type="datetimeFigureOut">
               <a:rPr lang="en-US" smtClean="0"/>
-              <a:t>11/18/21</a:t>
+              <a:t>1/11/22</a:t>
             </a:fld>
             <a:endParaRPr lang="en-US" dirty="0"/>
           </a:p>
@@ -1186,7 +1271,7 @@
           <a:p>
             <a:fld id="{A940254F-D129-FD4A-9280-0810AAA19FB6}" type="datetimeFigureOut">
               <a:rPr lang="en-US" smtClean="0"/>
-              <a:t>11/18/21</a:t>
+              <a:t>1/11/22</a:t>
             </a:fld>
             <a:endParaRPr lang="en-US" dirty="0"/>
           </a:p>
@@ -1384,7 +1469,7 @@
           <a:p>
             <a:fld id="{A940254F-D129-FD4A-9280-0810AAA19FB6}" type="datetimeFigureOut">
               <a:rPr lang="en-US" smtClean="0"/>
-              <a:t>11/18/21</a:t>
+              <a:t>1/11/22</a:t>
             </a:fld>
             <a:endParaRPr lang="en-US" dirty="0"/>
           </a:p>
@@ -1659,7 +1744,7 @@
           <a:p>
             <a:fld id="{A940254F-D129-FD4A-9280-0810AAA19FB6}" type="datetimeFigureOut">
               <a:rPr lang="en-US" smtClean="0"/>
-              <a:t>11/18/21</a:t>
+              <a:t>1/11/22</a:t>
             </a:fld>
             <a:endParaRPr lang="en-US" dirty="0"/>
           </a:p>
@@ -1924,7 +2009,7 @@
           <a:p>
             <a:fld id="{A940254F-D129-FD4A-9280-0810AAA19FB6}" type="datetimeFigureOut">
               <a:rPr lang="en-US" smtClean="0"/>
-              <a:t>11/18/21</a:t>
+              <a:t>1/11/22</a:t>
             </a:fld>
             <a:endParaRPr lang="en-US" dirty="0"/>
           </a:p>
@@ -2336,7 +2421,7 @@
           <a:p>
             <a:fld id="{A940254F-D129-FD4A-9280-0810AAA19FB6}" type="datetimeFigureOut">
               <a:rPr lang="en-US" smtClean="0"/>
-              <a:t>11/18/21</a:t>
+              <a:t>1/11/22</a:t>
             </a:fld>
             <a:endParaRPr lang="en-US" dirty="0"/>
           </a:p>
@@ -2477,7 +2562,7 @@
           <a:p>
             <a:fld id="{A940254F-D129-FD4A-9280-0810AAA19FB6}" type="datetimeFigureOut">
               <a:rPr lang="en-US" smtClean="0"/>
-              <a:t>11/18/21</a:t>
+              <a:t>1/11/22</a:t>
             </a:fld>
             <a:endParaRPr lang="en-US" dirty="0"/>
           </a:p>
@@ -2590,7 +2675,7 @@
           <a:p>
             <a:fld id="{A940254F-D129-FD4A-9280-0810AAA19FB6}" type="datetimeFigureOut">
               <a:rPr lang="en-US" smtClean="0"/>
-              <a:t>11/18/21</a:t>
+              <a:t>1/11/22</a:t>
             </a:fld>
             <a:endParaRPr lang="en-US" dirty="0"/>
           </a:p>
@@ -2901,7 +2986,7 @@
           <a:p>
             <a:fld id="{A940254F-D129-FD4A-9280-0810AAA19FB6}" type="datetimeFigureOut">
               <a:rPr lang="en-US" smtClean="0"/>
-              <a:t>11/18/21</a:t>
+              <a:t>1/11/22</a:t>
             </a:fld>
             <a:endParaRPr lang="en-US" dirty="0"/>
           </a:p>
@@ -3189,7 +3274,7 @@
           <a:p>
             <a:fld id="{A940254F-D129-FD4A-9280-0810AAA19FB6}" type="datetimeFigureOut">
               <a:rPr lang="en-US" smtClean="0"/>
-              <a:t>11/18/21</a:t>
+              <a:t>1/11/22</a:t>
             </a:fld>
             <a:endParaRPr lang="en-US" dirty="0"/>
           </a:p>
@@ -3430,7 +3515,7 @@
           <a:p>
             <a:fld id="{A940254F-D129-FD4A-9280-0810AAA19FB6}" type="datetimeFigureOut">
               <a:rPr lang="en-US" smtClean="0"/>
-              <a:t>11/18/21</a:t>
+              <a:t>1/11/22</a:t>
             </a:fld>
             <a:endParaRPr lang="en-US" dirty="0"/>
           </a:p>
@@ -6188,6 +6273,1513 @@
     <p:extLst>
       <p:ext uri="{BB962C8B-B14F-4D97-AF65-F5344CB8AC3E}">
         <p14:creationId xmlns:p14="http://schemas.microsoft.com/office/powerpoint/2010/main" val="1863024616"/>
+      </p:ext>
+    </p:extLst>
+  </p:cSld>
+  <p:clrMapOvr>
+    <a:masterClrMapping/>
+  </p:clrMapOvr>
+</p:sld>
+</file>
+
+<file path=ppt/slides/slide3.xml><?xml version="1.0" encoding="utf-8"?>
+<p:sld xmlns:a="http://schemas.openxmlformats.org/drawingml/2006/main" xmlns:r="http://schemas.openxmlformats.org/officeDocument/2006/relationships" xmlns:p="http://schemas.openxmlformats.org/presentationml/2006/main">
+  <p:cSld>
+    <p:spTree>
+      <p:nvGrpSpPr>
+        <p:cNvPr id="1" name=""/>
+        <p:cNvGrpSpPr/>
+        <p:nvPr/>
+      </p:nvGrpSpPr>
+      <p:grpSpPr>
+        <a:xfrm>
+          <a:off x="0" y="0"/>
+          <a:ext cx="0" cy="0"/>
+          <a:chOff x="0" y="0"/>
+          <a:chExt cx="0" cy="0"/>
+        </a:xfrm>
+      </p:grpSpPr>
+      <p:sp>
+        <p:nvSpPr>
+          <p:cNvPr id="8" name="Rectangle 7">
+            <a:extLst>
+              <a:ext uri="{FF2B5EF4-FFF2-40B4-BE49-F238E27FC236}">
+                <a16:creationId xmlns:a16="http://schemas.microsoft.com/office/drawing/2014/main" id="{BBB646D4-0FA9-674F-ACBD-D9A5C7E55063}"/>
+              </a:ext>
+            </a:extLst>
+          </p:cNvPr>
+          <p:cNvSpPr/>
+          <p:nvPr/>
+        </p:nvSpPr>
+        <p:spPr>
+          <a:xfrm>
+            <a:off x="6655122" y="994534"/>
+            <a:ext cx="914400" cy="274320"/>
+          </a:xfrm>
+          <a:prstGeom prst="rect">
+            <a:avLst/>
+          </a:prstGeom>
+          <a:solidFill>
+            <a:srgbClr val="8F653C"/>
+          </a:solidFill>
+          <a:ln>
+            <a:noFill/>
+          </a:ln>
+        </p:spPr>
+        <p:style>
+          <a:lnRef idx="2">
+            <a:schemeClr val="accent1">
+              <a:shade val="50000"/>
+            </a:schemeClr>
+          </a:lnRef>
+          <a:fillRef idx="1">
+            <a:schemeClr val="accent1"/>
+          </a:fillRef>
+          <a:effectRef idx="0">
+            <a:schemeClr val="accent1"/>
+          </a:effectRef>
+          <a:fontRef idx="minor">
+            <a:schemeClr val="lt1"/>
+          </a:fontRef>
+        </p:style>
+        <p:txBody>
+          <a:bodyPr rtlCol="0" anchor="ctr"/>
+          <a:lstStyle/>
+          <a:p>
+            <a:pPr algn="ctr"/>
+            <a:r>
+              <a:rPr lang="en-US" sz="1400" dirty="0"/>
+              <a:t>f81862f</a:t>
+            </a:r>
+            <a:endParaRPr lang="en-US" sz="1400" dirty="0">
+              <a:solidFill>
+                <a:schemeClr val="bg1"/>
+              </a:solidFill>
+              <a:latin typeface="Arial" panose="020B0604020202020204" pitchFamily="34" charset="0"/>
+              <a:cs typeface="Arial" panose="020B0604020202020204" pitchFamily="34" charset="0"/>
+            </a:endParaRPr>
+          </a:p>
+        </p:txBody>
+      </p:sp>
+      <p:sp>
+        <p:nvSpPr>
+          <p:cNvPr id="19" name="Rectangle 18">
+            <a:extLst>
+              <a:ext uri="{FF2B5EF4-FFF2-40B4-BE49-F238E27FC236}">
+                <a16:creationId xmlns:a16="http://schemas.microsoft.com/office/drawing/2014/main" id="{48B28E6B-E7A6-F54F-8F47-5E17DDD11403}"/>
+              </a:ext>
+            </a:extLst>
+          </p:cNvPr>
+          <p:cNvSpPr/>
+          <p:nvPr/>
+        </p:nvSpPr>
+        <p:spPr>
+          <a:xfrm>
+            <a:off x="4600804" y="3204540"/>
+            <a:ext cx="912339" cy="274320"/>
+          </a:xfrm>
+          <a:prstGeom prst="rect">
+            <a:avLst/>
+          </a:prstGeom>
+          <a:solidFill>
+            <a:srgbClr val="BEBEC1"/>
+          </a:solidFill>
+          <a:ln>
+            <a:noFill/>
+          </a:ln>
+        </p:spPr>
+        <p:style>
+          <a:lnRef idx="2">
+            <a:schemeClr val="accent1">
+              <a:shade val="50000"/>
+            </a:schemeClr>
+          </a:lnRef>
+          <a:fillRef idx="1">
+            <a:schemeClr val="accent1"/>
+          </a:fillRef>
+          <a:effectRef idx="0">
+            <a:schemeClr val="accent1"/>
+          </a:effectRef>
+          <a:fontRef idx="minor">
+            <a:schemeClr val="lt1"/>
+          </a:fontRef>
+        </p:style>
+        <p:txBody>
+          <a:bodyPr rtlCol="0" anchor="ctr"/>
+          <a:lstStyle/>
+          <a:p>
+            <a:pPr algn="ctr"/>
+            <a:r>
+              <a:rPr lang="en-US" sz="1400" dirty="0">
+                <a:solidFill>
+                  <a:schemeClr val="tx1"/>
+                </a:solidFill>
+                <a:latin typeface="Arial" panose="020B0604020202020204" pitchFamily="34" charset="0"/>
+                <a:cs typeface="Arial" panose="020B0604020202020204" pitchFamily="34" charset="0"/>
+              </a:rPr>
+              <a:t>feeddd3</a:t>
+            </a:r>
+          </a:p>
+        </p:txBody>
+      </p:sp>
+      <p:sp>
+        <p:nvSpPr>
+          <p:cNvPr id="20" name="Rectangle 19">
+            <a:extLst>
+              <a:ext uri="{FF2B5EF4-FFF2-40B4-BE49-F238E27FC236}">
+                <a16:creationId xmlns:a16="http://schemas.microsoft.com/office/drawing/2014/main" id="{B687B3FE-7388-4B41-A0C0-6835CB63E06F}"/>
+              </a:ext>
+            </a:extLst>
+          </p:cNvPr>
+          <p:cNvSpPr/>
+          <p:nvPr/>
+        </p:nvSpPr>
+        <p:spPr>
+          <a:xfrm>
+            <a:off x="4598743" y="1854298"/>
+            <a:ext cx="914400" cy="274320"/>
+          </a:xfrm>
+          <a:prstGeom prst="rect">
+            <a:avLst/>
+          </a:prstGeom>
+          <a:solidFill>
+            <a:srgbClr val="40612E"/>
+          </a:solidFill>
+          <a:ln>
+            <a:noFill/>
+          </a:ln>
+        </p:spPr>
+        <p:style>
+          <a:lnRef idx="2">
+            <a:schemeClr val="accent1">
+              <a:shade val="50000"/>
+            </a:schemeClr>
+          </a:lnRef>
+          <a:fillRef idx="1">
+            <a:schemeClr val="accent1"/>
+          </a:fillRef>
+          <a:effectRef idx="0">
+            <a:schemeClr val="accent1"/>
+          </a:effectRef>
+          <a:fontRef idx="minor">
+            <a:schemeClr val="lt1"/>
+          </a:fontRef>
+        </p:style>
+        <p:txBody>
+          <a:bodyPr rtlCol="0" anchor="ctr"/>
+          <a:lstStyle/>
+          <a:p>
+            <a:pPr algn="ctr"/>
+            <a:r>
+              <a:rPr lang="en-US" sz="1400" dirty="0"/>
+              <a:t>e8ad30b</a:t>
+            </a:r>
+            <a:endParaRPr lang="en-US" sz="1400" dirty="0">
+              <a:solidFill>
+                <a:schemeClr val="bg1"/>
+              </a:solidFill>
+              <a:latin typeface="Arial" panose="020B0604020202020204" pitchFamily="34" charset="0"/>
+              <a:cs typeface="Arial" panose="020B0604020202020204" pitchFamily="34" charset="0"/>
+            </a:endParaRPr>
+          </a:p>
+        </p:txBody>
+      </p:sp>
+      <p:sp>
+        <p:nvSpPr>
+          <p:cNvPr id="24" name="TextBox 23">
+            <a:extLst>
+              <a:ext uri="{FF2B5EF4-FFF2-40B4-BE49-F238E27FC236}">
+                <a16:creationId xmlns:a16="http://schemas.microsoft.com/office/drawing/2014/main" id="{D5B96A5A-BC2F-9747-95E0-1E2D3203745D}"/>
+              </a:ext>
+            </a:extLst>
+          </p:cNvPr>
+          <p:cNvSpPr txBox="1"/>
+          <p:nvPr/>
+        </p:nvSpPr>
+        <p:spPr>
+          <a:xfrm>
+            <a:off x="4258373" y="1352721"/>
+            <a:ext cx="1600246" cy="523220"/>
+          </a:xfrm>
+          <a:prstGeom prst="rect">
+            <a:avLst/>
+          </a:prstGeom>
+          <a:noFill/>
+        </p:spPr>
+        <p:txBody>
+          <a:bodyPr wrap="none" rtlCol="0">
+            <a:spAutoFit/>
+          </a:bodyPr>
+          <a:lstStyle/>
+          <a:p>
+            <a:pPr algn="ctr"/>
+            <a:r>
+              <a:rPr lang="en-US" sz="1400" dirty="0"/>
+              <a:t>Begin analyzing the</a:t>
+            </a:r>
+          </a:p>
+          <a:p>
+            <a:pPr algn="ctr"/>
+            <a:r>
+              <a:rPr lang="en-US" sz="1400" dirty="0"/>
+              <a:t>airquality dataset</a:t>
+            </a:r>
+          </a:p>
+        </p:txBody>
+      </p:sp>
+      <p:sp>
+        <p:nvSpPr>
+          <p:cNvPr id="3" name="TextBox 2">
+            <a:extLst>
+              <a:ext uri="{FF2B5EF4-FFF2-40B4-BE49-F238E27FC236}">
+                <a16:creationId xmlns:a16="http://schemas.microsoft.com/office/drawing/2014/main" id="{2D32CD67-7C73-9040-836F-DC5955DA7088}"/>
+              </a:ext>
+            </a:extLst>
+          </p:cNvPr>
+          <p:cNvSpPr txBox="1"/>
+          <p:nvPr/>
+        </p:nvSpPr>
+        <p:spPr>
+          <a:xfrm>
+            <a:off x="6387097" y="480038"/>
+            <a:ext cx="1266822" cy="523220"/>
+          </a:xfrm>
+          <a:prstGeom prst="rect">
+            <a:avLst/>
+          </a:prstGeom>
+          <a:noFill/>
+        </p:spPr>
+        <p:txBody>
+          <a:bodyPr wrap="square" rtlCol="0">
+            <a:spAutoFit/>
+          </a:bodyPr>
+          <a:lstStyle/>
+          <a:p>
+            <a:pPr algn="ctr"/>
+            <a:r>
+              <a:rPr lang="en-US" sz="1400" dirty="0"/>
+              <a:t>Switch to</a:t>
+            </a:r>
+          </a:p>
+          <a:p>
+            <a:pPr algn="ctr"/>
+            <a:r>
+              <a:rPr lang="en-US" sz="1400" dirty="0"/>
+              <a:t>UKgas dataset</a:t>
+            </a:r>
+          </a:p>
+        </p:txBody>
+      </p:sp>
+      <p:sp>
+        <p:nvSpPr>
+          <p:cNvPr id="35" name="TextBox 34">
+            <a:extLst>
+              <a:ext uri="{FF2B5EF4-FFF2-40B4-BE49-F238E27FC236}">
+                <a16:creationId xmlns:a16="http://schemas.microsoft.com/office/drawing/2014/main" id="{AC15B17D-3D9E-114B-BEEF-97183CD4F558}"/>
+              </a:ext>
+            </a:extLst>
+          </p:cNvPr>
+          <p:cNvSpPr txBox="1"/>
+          <p:nvPr/>
+        </p:nvSpPr>
+        <p:spPr>
+          <a:xfrm>
+            <a:off x="4630290" y="792267"/>
+            <a:ext cx="1454629" cy="307777"/>
+          </a:xfrm>
+          <a:prstGeom prst="rect">
+            <a:avLst/>
+          </a:prstGeom>
+          <a:noFill/>
+        </p:spPr>
+        <p:txBody>
+          <a:bodyPr wrap="none" rtlCol="0">
+            <a:spAutoFit/>
+          </a:bodyPr>
+          <a:lstStyle/>
+          <a:p>
+            <a:r>
+              <a:rPr lang="en-US" sz="1400" dirty="0"/>
+              <a:t>New code branch</a:t>
+            </a:r>
+          </a:p>
+        </p:txBody>
+      </p:sp>
+      <p:sp>
+        <p:nvSpPr>
+          <p:cNvPr id="36" name="TextBox 35">
+            <a:extLst>
+              <a:ext uri="{FF2B5EF4-FFF2-40B4-BE49-F238E27FC236}">
+                <a16:creationId xmlns:a16="http://schemas.microsoft.com/office/drawing/2014/main" id="{1355832B-AE7B-1948-9AD2-B77E3D48E6A3}"/>
+              </a:ext>
+            </a:extLst>
+          </p:cNvPr>
+          <p:cNvSpPr txBox="1"/>
+          <p:nvPr/>
+        </p:nvSpPr>
+        <p:spPr>
+          <a:xfrm>
+            <a:off x="2348892" y="3541213"/>
+            <a:ext cx="1619739" cy="523220"/>
+          </a:xfrm>
+          <a:prstGeom prst="rect">
+            <a:avLst/>
+          </a:prstGeom>
+          <a:noFill/>
+        </p:spPr>
+        <p:txBody>
+          <a:bodyPr wrap="none" rtlCol="0">
+            <a:spAutoFit/>
+          </a:bodyPr>
+          <a:lstStyle/>
+          <a:p>
+            <a:r>
+              <a:rPr lang="en-US" sz="2800" dirty="0"/>
+              <a:t>Data repo</a:t>
+            </a:r>
+          </a:p>
+        </p:txBody>
+      </p:sp>
+      <p:sp>
+        <p:nvSpPr>
+          <p:cNvPr id="37" name="TextBox 36">
+            <a:extLst>
+              <a:ext uri="{FF2B5EF4-FFF2-40B4-BE49-F238E27FC236}">
+                <a16:creationId xmlns:a16="http://schemas.microsoft.com/office/drawing/2014/main" id="{4543A93B-5889-244A-9D8C-7A3AAD6513D6}"/>
+              </a:ext>
+            </a:extLst>
+          </p:cNvPr>
+          <p:cNvSpPr txBox="1"/>
+          <p:nvPr/>
+        </p:nvSpPr>
+        <p:spPr>
+          <a:xfrm>
+            <a:off x="3098036" y="3433491"/>
+            <a:ext cx="184731" cy="369332"/>
+          </a:xfrm>
+          <a:prstGeom prst="rect">
+            <a:avLst/>
+          </a:prstGeom>
+          <a:noFill/>
+        </p:spPr>
+        <p:txBody>
+          <a:bodyPr wrap="none" rtlCol="0">
+            <a:spAutoFit/>
+          </a:bodyPr>
+          <a:lstStyle/>
+          <a:p>
+            <a:endParaRPr lang="en-US" dirty="0"/>
+          </a:p>
+        </p:txBody>
+      </p:sp>
+      <p:sp>
+        <p:nvSpPr>
+          <p:cNvPr id="39" name="TextBox 38">
+            <a:extLst>
+              <a:ext uri="{FF2B5EF4-FFF2-40B4-BE49-F238E27FC236}">
+                <a16:creationId xmlns:a16="http://schemas.microsoft.com/office/drawing/2014/main" id="{97881979-0AEB-834B-822B-430FA011521E}"/>
+              </a:ext>
+            </a:extLst>
+          </p:cNvPr>
+          <p:cNvSpPr txBox="1"/>
+          <p:nvPr/>
+        </p:nvSpPr>
+        <p:spPr>
+          <a:xfrm>
+            <a:off x="2303949" y="1250147"/>
+            <a:ext cx="1689950" cy="523220"/>
+          </a:xfrm>
+          <a:prstGeom prst="rect">
+            <a:avLst/>
+          </a:prstGeom>
+          <a:noFill/>
+        </p:spPr>
+        <p:txBody>
+          <a:bodyPr wrap="none" rtlCol="0">
+            <a:spAutoFit/>
+          </a:bodyPr>
+          <a:lstStyle/>
+          <a:p>
+            <a:r>
+              <a:rPr lang="en-US" sz="2800" dirty="0"/>
+              <a:t>Code repo</a:t>
+            </a:r>
+          </a:p>
+        </p:txBody>
+      </p:sp>
+      <p:sp>
+        <p:nvSpPr>
+          <p:cNvPr id="40" name="TextBox 39">
+            <a:extLst>
+              <a:ext uri="{FF2B5EF4-FFF2-40B4-BE49-F238E27FC236}">
+                <a16:creationId xmlns:a16="http://schemas.microsoft.com/office/drawing/2014/main" id="{39AEE274-9650-2C4A-9BAC-DE719D2541D9}"/>
+              </a:ext>
+            </a:extLst>
+          </p:cNvPr>
+          <p:cNvSpPr txBox="1"/>
+          <p:nvPr/>
+        </p:nvSpPr>
+        <p:spPr>
+          <a:xfrm>
+            <a:off x="4038375" y="2520057"/>
+            <a:ext cx="1919888" cy="523220"/>
+          </a:xfrm>
+          <a:prstGeom prst="rect">
+            <a:avLst/>
+          </a:prstGeom>
+          <a:noFill/>
+        </p:spPr>
+        <p:txBody>
+          <a:bodyPr wrap="square" rtlCol="0">
+            <a:spAutoFit/>
+          </a:bodyPr>
+          <a:lstStyle/>
+          <a:p>
+            <a:pPr algn="ctr"/>
+            <a:r>
+              <a:rPr lang="en-US" sz="1400" dirty="0">
+                <a:cs typeface="Arial" panose="020B0604020202020204" pitchFamily="34" charset="0"/>
+              </a:rPr>
+              <a:t>Data snapshots in</a:t>
+            </a:r>
+          </a:p>
+          <a:p>
+            <a:pPr algn="ctr"/>
+            <a:r>
+              <a:rPr lang="en-US" sz="1400" dirty="0">
+                <a:cs typeface="Arial" panose="020B0604020202020204" pitchFamily="34" charset="0"/>
+              </a:rPr>
+              <a:t>branch </a:t>
+            </a:r>
+            <a:r>
+              <a:rPr lang="en-US" sz="1400" b="1" dirty="0">
+                <a:solidFill>
+                  <a:schemeClr val="bg1"/>
+                </a:solidFill>
+                <a:highlight>
+                  <a:srgbClr val="40612E"/>
+                </a:highlight>
+                <a:cs typeface="Arial" panose="020B0604020202020204" pitchFamily="34" charset="0"/>
+              </a:rPr>
+              <a:t> code=</a:t>
+            </a:r>
+            <a:r>
+              <a:rPr lang="en-US" sz="1400" b="1" dirty="0">
+                <a:solidFill>
+                  <a:schemeClr val="bg1"/>
+                </a:solidFill>
+                <a:highlight>
+                  <a:srgbClr val="40612E"/>
+                </a:highlight>
+              </a:rPr>
+              <a:t>e8ad30b</a:t>
+            </a:r>
+            <a:r>
+              <a:rPr lang="en-US" sz="1400" dirty="0"/>
+              <a:t>:</a:t>
+            </a:r>
+            <a:endParaRPr lang="en-US" sz="1400" dirty="0">
+              <a:cs typeface="Arial" panose="020B0604020202020204" pitchFamily="34" charset="0"/>
+            </a:endParaRPr>
+          </a:p>
+        </p:txBody>
+      </p:sp>
+      <p:cxnSp>
+        <p:nvCxnSpPr>
+          <p:cNvPr id="57" name="Elbow Connector 56">
+            <a:extLst>
+              <a:ext uri="{FF2B5EF4-FFF2-40B4-BE49-F238E27FC236}">
+                <a16:creationId xmlns:a16="http://schemas.microsoft.com/office/drawing/2014/main" id="{CB5F599B-9273-944A-8659-57782C900B66}"/>
+              </a:ext>
+            </a:extLst>
+          </p:cNvPr>
+          <p:cNvCxnSpPr>
+            <a:cxnSpLocks/>
+          </p:cNvCxnSpPr>
+          <p:nvPr/>
+        </p:nvCxnSpPr>
+        <p:spPr>
+          <a:xfrm flipV="1">
+            <a:off x="5055943" y="1131694"/>
+            <a:ext cx="1530959" cy="196582"/>
+          </a:xfrm>
+          <a:prstGeom prst="bentConnector3">
+            <a:avLst>
+              <a:gd name="adj1" fmla="val 917"/>
+            </a:avLst>
+          </a:prstGeom>
+          <a:ln w="19050">
+            <a:solidFill>
+              <a:schemeClr val="tx1"/>
+            </a:solidFill>
+            <a:tailEnd type="triangle"/>
+          </a:ln>
+        </p:spPr>
+        <p:style>
+          <a:lnRef idx="1">
+            <a:schemeClr val="accent1"/>
+          </a:lnRef>
+          <a:fillRef idx="0">
+            <a:schemeClr val="accent1"/>
+          </a:fillRef>
+          <a:effectRef idx="0">
+            <a:schemeClr val="accent1"/>
+          </a:effectRef>
+          <a:fontRef idx="minor">
+            <a:schemeClr val="tx1"/>
+          </a:fontRef>
+        </p:style>
+      </p:cxnSp>
+      <p:sp>
+        <p:nvSpPr>
+          <p:cNvPr id="75" name="Rectangle 74">
+            <a:extLst>
+              <a:ext uri="{FF2B5EF4-FFF2-40B4-BE49-F238E27FC236}">
+                <a16:creationId xmlns:a16="http://schemas.microsoft.com/office/drawing/2014/main" id="{FD70D0AF-BA59-2648-8BB1-6CC913A925D0}"/>
+              </a:ext>
+            </a:extLst>
+          </p:cNvPr>
+          <p:cNvSpPr/>
+          <p:nvPr/>
+        </p:nvSpPr>
+        <p:spPr>
+          <a:xfrm>
+            <a:off x="8648621" y="994534"/>
+            <a:ext cx="914400" cy="274320"/>
+          </a:xfrm>
+          <a:prstGeom prst="rect">
+            <a:avLst/>
+          </a:prstGeom>
+          <a:solidFill>
+            <a:srgbClr val="8F653C"/>
+          </a:solidFill>
+          <a:ln>
+            <a:noFill/>
+          </a:ln>
+        </p:spPr>
+        <p:style>
+          <a:lnRef idx="2">
+            <a:schemeClr val="accent1">
+              <a:shade val="50000"/>
+            </a:schemeClr>
+          </a:lnRef>
+          <a:fillRef idx="1">
+            <a:schemeClr val="accent1"/>
+          </a:fillRef>
+          <a:effectRef idx="0">
+            <a:schemeClr val="accent1"/>
+          </a:effectRef>
+          <a:fontRef idx="minor">
+            <a:schemeClr val="lt1"/>
+          </a:fontRef>
+        </p:style>
+        <p:txBody>
+          <a:bodyPr rtlCol="0" anchor="ctr"/>
+          <a:lstStyle/>
+          <a:p>
+            <a:pPr algn="ctr"/>
+            <a:r>
+              <a:rPr lang="en-US" sz="1400" dirty="0"/>
+              <a:t>7777678</a:t>
+            </a:r>
+            <a:endParaRPr lang="en-US" sz="1400" dirty="0">
+              <a:solidFill>
+                <a:schemeClr val="bg1"/>
+              </a:solidFill>
+              <a:latin typeface="Arial" panose="020B0604020202020204" pitchFamily="34" charset="0"/>
+              <a:cs typeface="Arial" panose="020B0604020202020204" pitchFamily="34" charset="0"/>
+            </a:endParaRPr>
+          </a:p>
+        </p:txBody>
+      </p:sp>
+      <p:sp>
+        <p:nvSpPr>
+          <p:cNvPr id="76" name="TextBox 75">
+            <a:extLst>
+              <a:ext uri="{FF2B5EF4-FFF2-40B4-BE49-F238E27FC236}">
+                <a16:creationId xmlns:a16="http://schemas.microsoft.com/office/drawing/2014/main" id="{67EE7E72-B37D-BE4C-A8CF-8A05CA6C9B31}"/>
+              </a:ext>
+            </a:extLst>
+          </p:cNvPr>
+          <p:cNvSpPr txBox="1"/>
+          <p:nvPr/>
+        </p:nvSpPr>
+        <p:spPr>
+          <a:xfrm>
+            <a:off x="8264564" y="711863"/>
+            <a:ext cx="1682514" cy="307777"/>
+          </a:xfrm>
+          <a:prstGeom prst="rect">
+            <a:avLst/>
+          </a:prstGeom>
+          <a:noFill/>
+        </p:spPr>
+        <p:txBody>
+          <a:bodyPr wrap="square" rtlCol="0">
+            <a:spAutoFit/>
+          </a:bodyPr>
+          <a:lstStyle/>
+          <a:p>
+            <a:pPr algn="ctr"/>
+            <a:r>
+              <a:rPr lang="en-US" sz="1400" dirty="0"/>
+              <a:t>Subsequent commit</a:t>
+            </a:r>
+          </a:p>
+        </p:txBody>
+      </p:sp>
+      <p:cxnSp>
+        <p:nvCxnSpPr>
+          <p:cNvPr id="77" name="Straight Arrow Connector 76">
+            <a:extLst>
+              <a:ext uri="{FF2B5EF4-FFF2-40B4-BE49-F238E27FC236}">
+                <a16:creationId xmlns:a16="http://schemas.microsoft.com/office/drawing/2014/main" id="{CE41D1D5-A0DD-FD47-A677-30CFD4CF02F6}"/>
+              </a:ext>
+            </a:extLst>
+          </p:cNvPr>
+          <p:cNvCxnSpPr>
+            <a:cxnSpLocks/>
+          </p:cNvCxnSpPr>
+          <p:nvPr/>
+        </p:nvCxnSpPr>
+        <p:spPr>
+          <a:xfrm>
+            <a:off x="7817654" y="1131694"/>
+            <a:ext cx="762747" cy="0"/>
+          </a:xfrm>
+          <a:prstGeom prst="straightConnector1">
+            <a:avLst/>
+          </a:prstGeom>
+          <a:ln w="19050">
+            <a:solidFill>
+              <a:schemeClr val="tx1"/>
+            </a:solidFill>
+            <a:tailEnd type="triangle"/>
+          </a:ln>
+        </p:spPr>
+        <p:style>
+          <a:lnRef idx="1">
+            <a:schemeClr val="accent1"/>
+          </a:lnRef>
+          <a:fillRef idx="0">
+            <a:schemeClr val="accent1"/>
+          </a:fillRef>
+          <a:effectRef idx="0">
+            <a:schemeClr val="accent1"/>
+          </a:effectRef>
+          <a:fontRef idx="minor">
+            <a:schemeClr val="tx1"/>
+          </a:fontRef>
+        </p:style>
+      </p:cxnSp>
+      <p:sp>
+        <p:nvSpPr>
+          <p:cNvPr id="82" name="Rectangle 81">
+            <a:extLst>
+              <a:ext uri="{FF2B5EF4-FFF2-40B4-BE49-F238E27FC236}">
+                <a16:creationId xmlns:a16="http://schemas.microsoft.com/office/drawing/2014/main" id="{F1CB3E85-98F9-1C41-81B0-946C66C2CB77}"/>
+              </a:ext>
+            </a:extLst>
+          </p:cNvPr>
+          <p:cNvSpPr/>
+          <p:nvPr/>
+        </p:nvSpPr>
+        <p:spPr>
+          <a:xfrm>
+            <a:off x="6660819" y="3239490"/>
+            <a:ext cx="912339" cy="274320"/>
+          </a:xfrm>
+          <a:prstGeom prst="rect">
+            <a:avLst/>
+          </a:prstGeom>
+          <a:solidFill>
+            <a:srgbClr val="BEBEC1"/>
+          </a:solidFill>
+          <a:ln>
+            <a:noFill/>
+          </a:ln>
+        </p:spPr>
+        <p:style>
+          <a:lnRef idx="2">
+            <a:schemeClr val="accent1">
+              <a:shade val="50000"/>
+            </a:schemeClr>
+          </a:lnRef>
+          <a:fillRef idx="1">
+            <a:schemeClr val="accent1"/>
+          </a:fillRef>
+          <a:effectRef idx="0">
+            <a:schemeClr val="accent1"/>
+          </a:effectRef>
+          <a:fontRef idx="minor">
+            <a:schemeClr val="lt1"/>
+          </a:fontRef>
+        </p:style>
+        <p:txBody>
+          <a:bodyPr rtlCol="0" anchor="ctr"/>
+          <a:lstStyle/>
+          <a:p>
+            <a:pPr algn="ctr"/>
+            <a:r>
+              <a:rPr lang="en-US" sz="1400" dirty="0">
+                <a:solidFill>
+                  <a:schemeClr val="tx1"/>
+                </a:solidFill>
+                <a:latin typeface="Arial" panose="020B0604020202020204" pitchFamily="34" charset="0"/>
+                <a:cs typeface="Arial" panose="020B0604020202020204" pitchFamily="34" charset="0"/>
+              </a:rPr>
+              <a:t>57bc7d3</a:t>
+            </a:r>
+          </a:p>
+        </p:txBody>
+      </p:sp>
+      <p:sp>
+        <p:nvSpPr>
+          <p:cNvPr id="85" name="Rectangle 84">
+            <a:extLst>
+              <a:ext uri="{FF2B5EF4-FFF2-40B4-BE49-F238E27FC236}">
+                <a16:creationId xmlns:a16="http://schemas.microsoft.com/office/drawing/2014/main" id="{9B4D2A2E-B5CD-0F40-97A3-7700B325C80E}"/>
+              </a:ext>
+            </a:extLst>
+          </p:cNvPr>
+          <p:cNvSpPr/>
+          <p:nvPr/>
+        </p:nvSpPr>
+        <p:spPr>
+          <a:xfrm>
+            <a:off x="8650682" y="3154339"/>
+            <a:ext cx="912339" cy="274320"/>
+          </a:xfrm>
+          <a:prstGeom prst="rect">
+            <a:avLst/>
+          </a:prstGeom>
+          <a:solidFill>
+            <a:srgbClr val="BEBEC1"/>
+          </a:solidFill>
+          <a:ln>
+            <a:noFill/>
+          </a:ln>
+        </p:spPr>
+        <p:style>
+          <a:lnRef idx="2">
+            <a:schemeClr val="accent1">
+              <a:shade val="50000"/>
+            </a:schemeClr>
+          </a:lnRef>
+          <a:fillRef idx="1">
+            <a:schemeClr val="accent1"/>
+          </a:fillRef>
+          <a:effectRef idx="0">
+            <a:schemeClr val="accent1"/>
+          </a:effectRef>
+          <a:fontRef idx="minor">
+            <a:schemeClr val="lt1"/>
+          </a:fontRef>
+        </p:style>
+        <p:txBody>
+          <a:bodyPr rtlCol="0" anchor="ctr"/>
+          <a:lstStyle/>
+          <a:p>
+            <a:pPr algn="ctr"/>
+            <a:r>
+              <a:rPr lang="en-US" sz="1400" dirty="0">
+                <a:solidFill>
+                  <a:schemeClr val="tx1"/>
+                </a:solidFill>
+                <a:latin typeface="Arial" panose="020B0604020202020204" pitchFamily="34" charset="0"/>
+                <a:cs typeface="Arial" panose="020B0604020202020204" pitchFamily="34" charset="0"/>
+              </a:rPr>
+              <a:t>45f454b</a:t>
+            </a:r>
+          </a:p>
+        </p:txBody>
+      </p:sp>
+      <p:cxnSp>
+        <p:nvCxnSpPr>
+          <p:cNvPr id="87" name="Straight Arrow Connector 86">
+            <a:extLst>
+              <a:ext uri="{FF2B5EF4-FFF2-40B4-BE49-F238E27FC236}">
+                <a16:creationId xmlns:a16="http://schemas.microsoft.com/office/drawing/2014/main" id="{438722D8-51A0-EC44-9F4F-EAD8A97C0319}"/>
+              </a:ext>
+            </a:extLst>
+          </p:cNvPr>
+          <p:cNvCxnSpPr>
+            <a:cxnSpLocks/>
+          </p:cNvCxnSpPr>
+          <p:nvPr/>
+        </p:nvCxnSpPr>
+        <p:spPr>
+          <a:xfrm flipV="1">
+            <a:off x="9106851" y="3512526"/>
+            <a:ext cx="0" cy="388961"/>
+          </a:xfrm>
+          <a:prstGeom prst="straightConnector1">
+            <a:avLst/>
+          </a:prstGeom>
+          <a:ln w="19050">
+            <a:solidFill>
+              <a:schemeClr val="tx1"/>
+            </a:solidFill>
+            <a:tailEnd type="triangle"/>
+          </a:ln>
+        </p:spPr>
+        <p:style>
+          <a:lnRef idx="1">
+            <a:schemeClr val="accent1"/>
+          </a:lnRef>
+          <a:fillRef idx="0">
+            <a:schemeClr val="accent1"/>
+          </a:fillRef>
+          <a:effectRef idx="0">
+            <a:schemeClr val="accent1"/>
+          </a:effectRef>
+          <a:fontRef idx="minor">
+            <a:schemeClr val="tx1"/>
+          </a:fontRef>
+        </p:style>
+      </p:cxnSp>
+      <p:sp>
+        <p:nvSpPr>
+          <p:cNvPr id="89" name="Rectangle 88">
+            <a:extLst>
+              <a:ext uri="{FF2B5EF4-FFF2-40B4-BE49-F238E27FC236}">
+                <a16:creationId xmlns:a16="http://schemas.microsoft.com/office/drawing/2014/main" id="{20FBEBD7-1970-2543-9C2B-D991742ED307}"/>
+              </a:ext>
+            </a:extLst>
+          </p:cNvPr>
+          <p:cNvSpPr/>
+          <p:nvPr/>
+        </p:nvSpPr>
+        <p:spPr>
+          <a:xfrm>
+            <a:off x="8694472" y="3993734"/>
+            <a:ext cx="912339" cy="274320"/>
+          </a:xfrm>
+          <a:prstGeom prst="rect">
+            <a:avLst/>
+          </a:prstGeom>
+          <a:solidFill>
+            <a:srgbClr val="BEBEC1"/>
+          </a:solidFill>
+          <a:ln>
+            <a:noFill/>
+          </a:ln>
+        </p:spPr>
+        <p:style>
+          <a:lnRef idx="2">
+            <a:schemeClr val="accent1">
+              <a:shade val="50000"/>
+            </a:schemeClr>
+          </a:lnRef>
+          <a:fillRef idx="1">
+            <a:schemeClr val="accent1"/>
+          </a:fillRef>
+          <a:effectRef idx="0">
+            <a:schemeClr val="accent1"/>
+          </a:effectRef>
+          <a:fontRef idx="minor">
+            <a:schemeClr val="lt1"/>
+          </a:fontRef>
+        </p:style>
+        <p:txBody>
+          <a:bodyPr rtlCol="0" anchor="ctr"/>
+          <a:lstStyle/>
+          <a:p>
+            <a:pPr algn="ctr"/>
+            <a:r>
+              <a:rPr lang="en-US" sz="1400" dirty="0">
+                <a:solidFill>
+                  <a:schemeClr val="tx1"/>
+                </a:solidFill>
+                <a:latin typeface="Arial" panose="020B0604020202020204" pitchFamily="34" charset="0"/>
+                <a:cs typeface="Arial" panose="020B0604020202020204" pitchFamily="34" charset="0"/>
+              </a:rPr>
+              <a:t>88bcb85</a:t>
+            </a:r>
+          </a:p>
+        </p:txBody>
+      </p:sp>
+      <p:sp>
+        <p:nvSpPr>
+          <p:cNvPr id="91" name="Left Bracket 90">
+            <a:extLst>
+              <a:ext uri="{FF2B5EF4-FFF2-40B4-BE49-F238E27FC236}">
+                <a16:creationId xmlns:a16="http://schemas.microsoft.com/office/drawing/2014/main" id="{DAFDE910-4B44-D248-B234-E1300452B86D}"/>
+              </a:ext>
+            </a:extLst>
+          </p:cNvPr>
+          <p:cNvSpPr/>
+          <p:nvPr/>
+        </p:nvSpPr>
+        <p:spPr>
+          <a:xfrm>
+            <a:off x="3979115" y="629739"/>
+            <a:ext cx="229426" cy="1722189"/>
+          </a:xfrm>
+          <a:prstGeom prst="leftBracket">
+            <a:avLst/>
+          </a:prstGeom>
+          <a:ln w="25400">
+            <a:solidFill>
+              <a:schemeClr val="tx1"/>
+            </a:solidFill>
+          </a:ln>
+        </p:spPr>
+        <p:style>
+          <a:lnRef idx="1">
+            <a:schemeClr val="accent1"/>
+          </a:lnRef>
+          <a:fillRef idx="0">
+            <a:schemeClr val="accent1"/>
+          </a:fillRef>
+          <a:effectRef idx="0">
+            <a:schemeClr val="accent1"/>
+          </a:effectRef>
+          <a:fontRef idx="minor">
+            <a:schemeClr val="tx1"/>
+          </a:fontRef>
+        </p:style>
+        <p:txBody>
+          <a:bodyPr rtlCol="0" anchor="ctr"/>
+          <a:lstStyle/>
+          <a:p>
+            <a:pPr algn="ctr"/>
+            <a:endParaRPr lang="en-US"/>
+          </a:p>
+        </p:txBody>
+      </p:sp>
+      <p:sp>
+        <p:nvSpPr>
+          <p:cNvPr id="92" name="Left Bracket 91">
+            <a:extLst>
+              <a:ext uri="{FF2B5EF4-FFF2-40B4-BE49-F238E27FC236}">
+                <a16:creationId xmlns:a16="http://schemas.microsoft.com/office/drawing/2014/main" id="{B75957B6-95FB-814F-97B2-B861D61599AE}"/>
+              </a:ext>
+            </a:extLst>
+          </p:cNvPr>
+          <p:cNvSpPr/>
+          <p:nvPr/>
+        </p:nvSpPr>
+        <p:spPr>
+          <a:xfrm>
+            <a:off x="3977776" y="2462760"/>
+            <a:ext cx="229426" cy="3015233"/>
+          </a:xfrm>
+          <a:prstGeom prst="leftBracket">
+            <a:avLst/>
+          </a:prstGeom>
+          <a:ln w="25400">
+            <a:solidFill>
+              <a:schemeClr val="tx1"/>
+            </a:solidFill>
+          </a:ln>
+        </p:spPr>
+        <p:style>
+          <a:lnRef idx="1">
+            <a:schemeClr val="accent1"/>
+          </a:lnRef>
+          <a:fillRef idx="0">
+            <a:schemeClr val="accent1"/>
+          </a:fillRef>
+          <a:effectRef idx="0">
+            <a:schemeClr val="accent1"/>
+          </a:effectRef>
+          <a:fontRef idx="minor">
+            <a:schemeClr val="tx1"/>
+          </a:fontRef>
+        </p:style>
+        <p:txBody>
+          <a:bodyPr rtlCol="0" anchor="ctr"/>
+          <a:lstStyle/>
+          <a:p>
+            <a:pPr algn="ctr"/>
+            <a:endParaRPr lang="en-US"/>
+          </a:p>
+        </p:txBody>
+      </p:sp>
+      <p:sp>
+        <p:nvSpPr>
+          <p:cNvPr id="100" name="TextBox 99">
+            <a:extLst>
+              <a:ext uri="{FF2B5EF4-FFF2-40B4-BE49-F238E27FC236}">
+                <a16:creationId xmlns:a16="http://schemas.microsoft.com/office/drawing/2014/main" id="{444BD959-7C43-744E-8FB1-E0916950902F}"/>
+              </a:ext>
+            </a:extLst>
+          </p:cNvPr>
+          <p:cNvSpPr txBox="1"/>
+          <p:nvPr/>
+        </p:nvSpPr>
+        <p:spPr>
+          <a:xfrm>
+            <a:off x="8199028" y="2555007"/>
+            <a:ext cx="1904945" cy="523220"/>
+          </a:xfrm>
+          <a:prstGeom prst="rect">
+            <a:avLst/>
+          </a:prstGeom>
+          <a:noFill/>
+        </p:spPr>
+        <p:txBody>
+          <a:bodyPr wrap="none" rtlCol="0">
+            <a:spAutoFit/>
+          </a:bodyPr>
+          <a:lstStyle/>
+          <a:p>
+            <a:pPr algn="ctr"/>
+            <a:r>
+              <a:rPr lang="en-US" sz="1400" dirty="0">
+                <a:cs typeface="Arial" panose="020B0604020202020204" pitchFamily="34" charset="0"/>
+              </a:rPr>
+              <a:t>Data snapshots in</a:t>
+            </a:r>
+          </a:p>
+          <a:p>
+            <a:pPr algn="ctr"/>
+            <a:r>
+              <a:rPr lang="en-US" sz="1400" dirty="0">
+                <a:cs typeface="Arial" panose="020B0604020202020204" pitchFamily="34" charset="0"/>
+              </a:rPr>
+              <a:t>Branch </a:t>
+            </a:r>
+            <a:r>
+              <a:rPr lang="en-US" sz="1400" b="1" dirty="0">
+                <a:solidFill>
+                  <a:schemeClr val="bg1"/>
+                </a:solidFill>
+                <a:highlight>
+                  <a:srgbClr val="8F653C"/>
+                </a:highlight>
+                <a:cs typeface="Arial" panose="020B0604020202020204" pitchFamily="34" charset="0"/>
+              </a:rPr>
+              <a:t> code=</a:t>
+            </a:r>
+            <a:r>
+              <a:rPr lang="en-US" sz="1400" b="1" dirty="0">
+                <a:solidFill>
+                  <a:schemeClr val="bg1"/>
+                </a:solidFill>
+                <a:highlight>
+                  <a:srgbClr val="8F653C"/>
+                </a:highlight>
+              </a:rPr>
+              <a:t>7777678</a:t>
+            </a:r>
+            <a:r>
+              <a:rPr lang="en-US" sz="1400" b="1" dirty="0"/>
+              <a:t>:</a:t>
+            </a:r>
+            <a:endParaRPr lang="en-US" sz="1400" b="1" dirty="0">
+              <a:cs typeface="Arial" panose="020B0604020202020204" pitchFamily="34" charset="0"/>
+            </a:endParaRPr>
+          </a:p>
+        </p:txBody>
+      </p:sp>
+      <p:sp>
+        <p:nvSpPr>
+          <p:cNvPr id="101" name="TextBox 100">
+            <a:extLst>
+              <a:ext uri="{FF2B5EF4-FFF2-40B4-BE49-F238E27FC236}">
+                <a16:creationId xmlns:a16="http://schemas.microsoft.com/office/drawing/2014/main" id="{CA51B2F0-C52B-C142-97C0-62EED43564AF}"/>
+              </a:ext>
+            </a:extLst>
+          </p:cNvPr>
+          <p:cNvSpPr txBox="1"/>
+          <p:nvPr/>
+        </p:nvSpPr>
+        <p:spPr>
+          <a:xfrm>
+            <a:off x="6162241" y="2555007"/>
+            <a:ext cx="1832809" cy="523220"/>
+          </a:xfrm>
+          <a:prstGeom prst="rect">
+            <a:avLst/>
+          </a:prstGeom>
+          <a:noFill/>
+        </p:spPr>
+        <p:txBody>
+          <a:bodyPr wrap="none" rtlCol="0">
+            <a:spAutoFit/>
+          </a:bodyPr>
+          <a:lstStyle/>
+          <a:p>
+            <a:pPr algn="ctr"/>
+            <a:r>
+              <a:rPr lang="en-US" sz="1400" dirty="0">
+                <a:cs typeface="Arial" panose="020B0604020202020204" pitchFamily="34" charset="0"/>
+              </a:rPr>
+              <a:t>Data snapshots in</a:t>
+            </a:r>
+          </a:p>
+          <a:p>
+            <a:pPr algn="ctr"/>
+            <a:r>
+              <a:rPr lang="en-US" sz="1400" dirty="0">
+                <a:cs typeface="Arial" panose="020B0604020202020204" pitchFamily="34" charset="0"/>
+              </a:rPr>
+              <a:t>branch </a:t>
+            </a:r>
+            <a:r>
+              <a:rPr lang="en-US" sz="1400" b="1" dirty="0">
+                <a:solidFill>
+                  <a:schemeClr val="bg1"/>
+                </a:solidFill>
+                <a:highlight>
+                  <a:srgbClr val="8F653C"/>
+                </a:highlight>
+                <a:cs typeface="Arial" panose="020B0604020202020204" pitchFamily="34" charset="0"/>
+              </a:rPr>
+              <a:t> code=</a:t>
+            </a:r>
+            <a:r>
+              <a:rPr lang="en-US" sz="1400" b="1" dirty="0">
+                <a:solidFill>
+                  <a:schemeClr val="bg1"/>
+                </a:solidFill>
+                <a:highlight>
+                  <a:srgbClr val="8F653C"/>
+                </a:highlight>
+              </a:rPr>
+              <a:t>f81862f</a:t>
+            </a:r>
+            <a:r>
+              <a:rPr lang="en-US" sz="1400" dirty="0"/>
+              <a:t>:</a:t>
+            </a:r>
+            <a:endParaRPr lang="en-US" sz="1400" dirty="0">
+              <a:cs typeface="Arial" panose="020B0604020202020204" pitchFamily="34" charset="0"/>
+            </a:endParaRPr>
+          </a:p>
+        </p:txBody>
+      </p:sp>
+      <p:sp>
+        <p:nvSpPr>
+          <p:cNvPr id="102" name="Rectangle 101">
+            <a:extLst>
+              <a:ext uri="{FF2B5EF4-FFF2-40B4-BE49-F238E27FC236}">
+                <a16:creationId xmlns:a16="http://schemas.microsoft.com/office/drawing/2014/main" id="{93BF44CB-8F8A-6E46-B81C-4F877DB1DE99}"/>
+              </a:ext>
+            </a:extLst>
+          </p:cNvPr>
+          <p:cNvSpPr/>
+          <p:nvPr/>
+        </p:nvSpPr>
+        <p:spPr>
+          <a:xfrm>
+            <a:off x="8681160" y="4837174"/>
+            <a:ext cx="912339" cy="274320"/>
+          </a:xfrm>
+          <a:prstGeom prst="rect">
+            <a:avLst/>
+          </a:prstGeom>
+          <a:solidFill>
+            <a:srgbClr val="BEBEC1"/>
+          </a:solidFill>
+          <a:ln>
+            <a:noFill/>
+          </a:ln>
+        </p:spPr>
+        <p:style>
+          <a:lnRef idx="2">
+            <a:schemeClr val="accent1">
+              <a:shade val="50000"/>
+            </a:schemeClr>
+          </a:lnRef>
+          <a:fillRef idx="1">
+            <a:schemeClr val="accent1"/>
+          </a:fillRef>
+          <a:effectRef idx="0">
+            <a:schemeClr val="accent1"/>
+          </a:effectRef>
+          <a:fontRef idx="minor">
+            <a:schemeClr val="lt1"/>
+          </a:fontRef>
+        </p:style>
+        <p:txBody>
+          <a:bodyPr rtlCol="0" anchor="ctr"/>
+          <a:lstStyle/>
+          <a:p>
+            <a:pPr algn="ctr"/>
+            <a:r>
+              <a:rPr lang="en-US" sz="1400" dirty="0">
+                <a:solidFill>
+                  <a:schemeClr val="tx1"/>
+                </a:solidFill>
+                <a:latin typeface="Arial" panose="020B0604020202020204" pitchFamily="34" charset="0"/>
+                <a:cs typeface="Arial" panose="020B0604020202020204" pitchFamily="34" charset="0"/>
+              </a:rPr>
+              <a:t>123bc12</a:t>
+            </a:r>
+          </a:p>
+        </p:txBody>
+      </p:sp>
+      <p:cxnSp>
+        <p:nvCxnSpPr>
+          <p:cNvPr id="103" name="Straight Arrow Connector 102">
+            <a:extLst>
+              <a:ext uri="{FF2B5EF4-FFF2-40B4-BE49-F238E27FC236}">
+                <a16:creationId xmlns:a16="http://schemas.microsoft.com/office/drawing/2014/main" id="{9864D6B4-9A21-4B4C-8A23-B839CD3C252C}"/>
+              </a:ext>
+            </a:extLst>
+          </p:cNvPr>
+          <p:cNvCxnSpPr>
+            <a:cxnSpLocks/>
+          </p:cNvCxnSpPr>
+          <p:nvPr/>
+        </p:nvCxnSpPr>
+        <p:spPr>
+          <a:xfrm flipV="1">
+            <a:off x="9150641" y="4341871"/>
+            <a:ext cx="0" cy="388961"/>
+          </a:xfrm>
+          <a:prstGeom prst="straightConnector1">
+            <a:avLst/>
+          </a:prstGeom>
+          <a:ln w="19050">
+            <a:solidFill>
+              <a:schemeClr val="tx1"/>
+            </a:solidFill>
+            <a:tailEnd type="triangle"/>
+          </a:ln>
+        </p:spPr>
+        <p:style>
+          <a:lnRef idx="1">
+            <a:schemeClr val="accent1"/>
+          </a:lnRef>
+          <a:fillRef idx="0">
+            <a:schemeClr val="accent1"/>
+          </a:fillRef>
+          <a:effectRef idx="0">
+            <a:schemeClr val="accent1"/>
+          </a:effectRef>
+          <a:fontRef idx="minor">
+            <a:schemeClr val="tx1"/>
+          </a:fontRef>
+        </p:style>
+      </p:cxnSp>
+      <p:sp>
+        <p:nvSpPr>
+          <p:cNvPr id="104" name="Left Bracket 103">
+            <a:extLst>
+              <a:ext uri="{FF2B5EF4-FFF2-40B4-BE49-F238E27FC236}">
+                <a16:creationId xmlns:a16="http://schemas.microsoft.com/office/drawing/2014/main" id="{088DECFB-463C-1C47-B354-964DC7FF3E2A}"/>
+              </a:ext>
+            </a:extLst>
+          </p:cNvPr>
+          <p:cNvSpPr/>
+          <p:nvPr/>
+        </p:nvSpPr>
+        <p:spPr>
+          <a:xfrm>
+            <a:off x="8471594" y="3869737"/>
+            <a:ext cx="229426" cy="1426871"/>
+          </a:xfrm>
+          <a:prstGeom prst="leftBracket">
+            <a:avLst/>
+          </a:prstGeom>
+          <a:ln w="25400">
+            <a:solidFill>
+              <a:schemeClr val="tx1"/>
+            </a:solidFill>
+          </a:ln>
+        </p:spPr>
+        <p:style>
+          <a:lnRef idx="1">
+            <a:schemeClr val="accent1"/>
+          </a:lnRef>
+          <a:fillRef idx="0">
+            <a:schemeClr val="accent1"/>
+          </a:fillRef>
+          <a:effectRef idx="0">
+            <a:schemeClr val="accent1"/>
+          </a:effectRef>
+          <a:fontRef idx="minor">
+            <a:schemeClr val="tx1"/>
+          </a:fontRef>
+        </p:style>
+        <p:txBody>
+          <a:bodyPr rtlCol="0" anchor="ctr"/>
+          <a:lstStyle/>
+          <a:p>
+            <a:pPr algn="ctr"/>
+            <a:endParaRPr lang="en-US"/>
+          </a:p>
+        </p:txBody>
+      </p:sp>
+      <p:sp>
+        <p:nvSpPr>
+          <p:cNvPr id="105" name="TextBox 104">
+            <a:extLst>
+              <a:ext uri="{FF2B5EF4-FFF2-40B4-BE49-F238E27FC236}">
+                <a16:creationId xmlns:a16="http://schemas.microsoft.com/office/drawing/2014/main" id="{5EE8C9F1-198E-4648-8809-C7786957913D}"/>
+              </a:ext>
+            </a:extLst>
+          </p:cNvPr>
+          <p:cNvSpPr txBox="1"/>
+          <p:nvPr/>
+        </p:nvSpPr>
+        <p:spPr>
+          <a:xfrm>
+            <a:off x="7199831" y="4375509"/>
+            <a:ext cx="1327736" cy="523220"/>
+          </a:xfrm>
+          <a:prstGeom prst="rect">
+            <a:avLst/>
+          </a:prstGeom>
+          <a:noFill/>
+        </p:spPr>
+        <p:txBody>
+          <a:bodyPr wrap="none" rtlCol="0">
+            <a:spAutoFit/>
+          </a:bodyPr>
+          <a:lstStyle/>
+          <a:p>
+            <a:pPr algn="ctr"/>
+            <a:r>
+              <a:rPr lang="en-US" sz="1400" dirty="0"/>
+              <a:t>Old superseded</a:t>
+            </a:r>
+          </a:p>
+          <a:p>
+            <a:pPr algn="ctr"/>
+            <a:r>
+              <a:rPr lang="en-US" sz="1400" dirty="0"/>
+              <a:t>snapshots</a:t>
+            </a:r>
+          </a:p>
+        </p:txBody>
+      </p:sp>
+      <p:cxnSp>
+        <p:nvCxnSpPr>
+          <p:cNvPr id="118" name="Straight Connector 117">
+            <a:extLst>
+              <a:ext uri="{FF2B5EF4-FFF2-40B4-BE49-F238E27FC236}">
+                <a16:creationId xmlns:a16="http://schemas.microsoft.com/office/drawing/2014/main" id="{A7351F1C-493F-6541-BAB2-12D532DD1B1B}"/>
+              </a:ext>
+            </a:extLst>
+          </p:cNvPr>
+          <p:cNvCxnSpPr/>
+          <p:nvPr/>
+        </p:nvCxnSpPr>
+        <p:spPr>
+          <a:xfrm>
+            <a:off x="7112322" y="1387671"/>
+            <a:ext cx="0" cy="1167336"/>
+          </a:xfrm>
+          <a:prstGeom prst="line">
+            <a:avLst/>
+          </a:prstGeom>
+          <a:ln w="25400" cmpd="dbl">
+            <a:solidFill>
+              <a:schemeClr val="tx1"/>
+            </a:solidFill>
+            <a:prstDash val="sysDash"/>
+          </a:ln>
+        </p:spPr>
+        <p:style>
+          <a:lnRef idx="1">
+            <a:schemeClr val="accent1"/>
+          </a:lnRef>
+          <a:fillRef idx="0">
+            <a:schemeClr val="accent1"/>
+          </a:fillRef>
+          <a:effectRef idx="0">
+            <a:schemeClr val="accent1"/>
+          </a:effectRef>
+          <a:fontRef idx="minor">
+            <a:schemeClr val="tx1"/>
+          </a:fontRef>
+        </p:style>
+      </p:cxnSp>
+      <p:cxnSp>
+        <p:nvCxnSpPr>
+          <p:cNvPr id="119" name="Straight Connector 118">
+            <a:extLst>
+              <a:ext uri="{FF2B5EF4-FFF2-40B4-BE49-F238E27FC236}">
+                <a16:creationId xmlns:a16="http://schemas.microsoft.com/office/drawing/2014/main" id="{25EE2F30-3988-C143-BF80-69F06108346E}"/>
+              </a:ext>
+            </a:extLst>
+          </p:cNvPr>
+          <p:cNvCxnSpPr/>
+          <p:nvPr/>
+        </p:nvCxnSpPr>
+        <p:spPr>
+          <a:xfrm>
+            <a:off x="9143678" y="1352721"/>
+            <a:ext cx="0" cy="1167336"/>
+          </a:xfrm>
+          <a:prstGeom prst="line">
+            <a:avLst/>
+          </a:prstGeom>
+          <a:ln w="25400" cmpd="dbl">
+            <a:solidFill>
+              <a:schemeClr val="tx1"/>
+            </a:solidFill>
+            <a:prstDash val="sysDash"/>
+          </a:ln>
+        </p:spPr>
+        <p:style>
+          <a:lnRef idx="1">
+            <a:schemeClr val="accent1"/>
+          </a:lnRef>
+          <a:fillRef idx="0">
+            <a:schemeClr val="accent1"/>
+          </a:fillRef>
+          <a:effectRef idx="0">
+            <a:schemeClr val="accent1"/>
+          </a:effectRef>
+          <a:fontRef idx="minor">
+            <a:schemeClr val="tx1"/>
+          </a:fontRef>
+        </p:style>
+      </p:cxnSp>
+      <p:cxnSp>
+        <p:nvCxnSpPr>
+          <p:cNvPr id="120" name="Straight Connector 119">
+            <a:extLst>
+              <a:ext uri="{FF2B5EF4-FFF2-40B4-BE49-F238E27FC236}">
+                <a16:creationId xmlns:a16="http://schemas.microsoft.com/office/drawing/2014/main" id="{69C2CF26-BF47-DD40-A862-C38D1C7ADAA4}"/>
+              </a:ext>
+            </a:extLst>
+          </p:cNvPr>
+          <p:cNvCxnSpPr>
+            <a:cxnSpLocks/>
+          </p:cNvCxnSpPr>
+          <p:nvPr/>
+        </p:nvCxnSpPr>
+        <p:spPr>
+          <a:xfrm>
+            <a:off x="5065900" y="2203403"/>
+            <a:ext cx="0" cy="335753"/>
+          </a:xfrm>
+          <a:prstGeom prst="line">
+            <a:avLst/>
+          </a:prstGeom>
+          <a:ln w="25400" cmpd="dbl">
+            <a:solidFill>
+              <a:schemeClr val="tx1"/>
+            </a:solidFill>
+            <a:prstDash val="sysDash"/>
+          </a:ln>
+        </p:spPr>
+        <p:style>
+          <a:lnRef idx="1">
+            <a:schemeClr val="accent1"/>
+          </a:lnRef>
+          <a:fillRef idx="0">
+            <a:schemeClr val="accent1"/>
+          </a:fillRef>
+          <a:effectRef idx="0">
+            <a:schemeClr val="accent1"/>
+          </a:effectRef>
+          <a:fontRef idx="minor">
+            <a:schemeClr val="tx1"/>
+          </a:fontRef>
+        </p:style>
+      </p:cxnSp>
+    </p:spTree>
+    <p:extLst>
+      <p:ext uri="{BB962C8B-B14F-4D97-AF65-F5344CB8AC3E}">
+        <p14:creationId xmlns:p14="http://schemas.microsoft.com/office/powerpoint/2010/main" val="35048718"/>
       </p:ext>
     </p:extLst>
   </p:cSld>

</xml_diff>